<commit_message>
Semi-finalized poster after meeting.
Relates to xwsxethan/MusicScoring#58
</commit_message>
<xml_diff>
--- a/Documents/Poster/IRD_Poster03.pptx
+++ b/Documents/Poster/IRD_Poster03.pptx
@@ -106,7 +106,7 @@
   </p:defaultTextStyle>
   <p:extLst>
     <p:ext uri="{EFAFB233-063F-42B5-8137-9DF3F51BA10A}">
-      <p15:sldGuideLst xmlns="" xmlns:p15="http://schemas.microsoft.com/office/powerpoint/2012/main">
+      <p15:sldGuideLst xmlns:p15="http://schemas.microsoft.com/office/powerpoint/2012/main" xmlns="">
         <p15:guide id="1" orient="horz" pos="11712" userDrawn="1">
           <p15:clr>
             <a:srgbClr val="A4A3A4"/>
@@ -1045,11 +1045,7 @@
         <a:p>
           <a:r>
             <a:rPr lang="en-US" dirty="0" smtClean="0"/>
-            <a:t>Step 3</a:t>
-          </a:r>
-          <a:r>
-            <a:rPr lang="en-US" dirty="0" smtClean="0"/>
-            <a:t>:         Passing           Data</a:t>
+            <a:t>Step 3:         Passing           Data</a:t>
           </a:r>
           <a:endParaRPr lang="en-US" dirty="0"/>
         </a:p>
@@ -1412,8 +1408,8 @@
     <dgm:cxn modelId="{90E338BA-937E-436F-960A-8F0DFDB6CFC5}" srcId="{3B3910AA-1A0F-4503-98CA-6EF297BF0FAA}" destId="{65E0FE40-0E11-454A-B6B1-5612F4AA7CC3}" srcOrd="0" destOrd="0" parTransId="{34734AA0-8CE6-4AE6-B893-B896DFAAB70A}" sibTransId="{6917D946-9507-4199-972F-537CE538D49D}"/>
     <dgm:cxn modelId="{BDAE583D-A5C5-4CEC-8024-B71CB6DC6ED9}" type="presOf" srcId="{3B3910AA-1A0F-4503-98CA-6EF297BF0FAA}" destId="{54E8410A-B97D-49B9-A453-3F2DCAFFBC79}" srcOrd="0" destOrd="0" presId="urn:diagrams.loki3.com/BracketList"/>
     <dgm:cxn modelId="{6DD96990-F46D-442C-80F1-EFB883165B37}" type="presOf" srcId="{4A405C09-125F-4B15-BD7C-89BA3701FB14}" destId="{F37F45AA-3EA9-4F4D-ACC0-68C75260DDC1}" srcOrd="0" destOrd="0" presId="urn:diagrams.loki3.com/BracketList"/>
+    <dgm:cxn modelId="{6B3B8A39-2803-4A0E-BE2E-8C754F5376DF}" srcId="{19C23CB9-D2FF-4738-945A-0B935497AF4D}" destId="{4A405C09-125F-4B15-BD7C-89BA3701FB14}" srcOrd="0" destOrd="0" parTransId="{889FA681-FB76-4196-BAAC-C5E5AB60E3E8}" sibTransId="{4A1D51AB-0D58-4F6E-AD3A-5B21DE56621A}"/>
     <dgm:cxn modelId="{0580FAB2-C4B7-42FA-9F28-2905394787D1}" type="presOf" srcId="{5223EB74-08EE-44A3-BB82-5894DB8CA90C}" destId="{3BB118F2-CA68-487A-AFE6-AC8E69DC36A5}" srcOrd="0" destOrd="0" presId="urn:diagrams.loki3.com/BracketList"/>
-    <dgm:cxn modelId="{6B3B8A39-2803-4A0E-BE2E-8C754F5376DF}" srcId="{19C23CB9-D2FF-4738-945A-0B935497AF4D}" destId="{4A405C09-125F-4B15-BD7C-89BA3701FB14}" srcOrd="0" destOrd="0" parTransId="{889FA681-FB76-4196-BAAC-C5E5AB60E3E8}" sibTransId="{4A1D51AB-0D58-4F6E-AD3A-5B21DE56621A}"/>
     <dgm:cxn modelId="{43C0E373-A4FD-4902-A05C-65E2327F51D4}" type="presOf" srcId="{65E0FE40-0E11-454A-B6B1-5612F4AA7CC3}" destId="{8F8999BA-3C8C-489C-9C0A-32D7AB1AEB32}" srcOrd="0" destOrd="0" presId="urn:diagrams.loki3.com/BracketList"/>
     <dgm:cxn modelId="{9F849F35-2213-46BD-B460-577E0BBC84A7}" type="presOf" srcId="{E7D12089-2F0A-45E8-8895-B1C32DA5BDFF}" destId="{BD7628EE-9705-475C-8391-676E29DE4168}" srcOrd="0" destOrd="0" presId="urn:diagrams.loki3.com/BracketList"/>
     <dgm:cxn modelId="{8D851E7C-AFCB-4361-A41E-57DD150CC9F6}" srcId="{C5A515D1-BF81-48EE-B69A-0C71BF5170EE}" destId="{5223EB74-08EE-44A3-BB82-5894DB8CA90C}" srcOrd="0" destOrd="0" parTransId="{DBD3BD88-ADF2-4858-A92D-CDA82E8190BC}" sibTransId="{D8117939-BA56-48D2-AB74-550B01B30C1D}"/>
@@ -1887,11 +1883,7 @@
           </a:pPr>
           <a:r>
             <a:rPr lang="en-US" sz="4100" kern="1200" dirty="0" smtClean="0"/>
-            <a:t>Step 3</a:t>
-          </a:r>
-          <a:r>
-            <a:rPr lang="en-US" sz="4100" kern="1200" dirty="0" smtClean="0"/>
-            <a:t>:         Passing           Data</a:t>
+            <a:t>Step 3:         Passing           Data</a:t>
           </a:r>
           <a:endParaRPr lang="en-US" sz="4100" kern="1200" dirty="0"/>
         </a:p>
@@ -3599,7 +3591,7 @@
           <a:p>
             <a:fld id="{3932A18B-CA16-46E3-BDB4-8DEE70D698F4}" type="datetimeFigureOut">
               <a:rPr lang="en-US" smtClean="0"/>
-              <a:t>2/10/15</a:t>
+              <a:t>2/12/15</a:t>
             </a:fld>
             <a:endParaRPr lang="en-US"/>
           </a:p>
@@ -3769,7 +3761,7 @@
           <a:p>
             <a:fld id="{3932A18B-CA16-46E3-BDB4-8DEE70D698F4}" type="datetimeFigureOut">
               <a:rPr lang="en-US" smtClean="0"/>
-              <a:t>2/10/15</a:t>
+              <a:t>2/12/15</a:t>
             </a:fld>
             <a:endParaRPr lang="en-US"/>
           </a:p>
@@ -3949,7 +3941,7 @@
           <a:p>
             <a:fld id="{3932A18B-CA16-46E3-BDB4-8DEE70D698F4}" type="datetimeFigureOut">
               <a:rPr lang="en-US" smtClean="0"/>
-              <a:t>2/10/15</a:t>
+              <a:t>2/12/15</a:t>
             </a:fld>
             <a:endParaRPr lang="en-US"/>
           </a:p>
@@ -4119,7 +4111,7 @@
           <a:p>
             <a:fld id="{3932A18B-CA16-46E3-BDB4-8DEE70D698F4}" type="datetimeFigureOut">
               <a:rPr lang="en-US" smtClean="0"/>
-              <a:t>2/10/15</a:t>
+              <a:t>2/12/15</a:t>
             </a:fld>
             <a:endParaRPr lang="en-US"/>
           </a:p>
@@ -4363,7 +4355,7 @@
           <a:p>
             <a:fld id="{3932A18B-CA16-46E3-BDB4-8DEE70D698F4}" type="datetimeFigureOut">
               <a:rPr lang="en-US" smtClean="0"/>
-              <a:t>2/10/15</a:t>
+              <a:t>2/12/15</a:t>
             </a:fld>
             <a:endParaRPr lang="en-US"/>
           </a:p>
@@ -4595,7 +4587,7 @@
           <a:p>
             <a:fld id="{3932A18B-CA16-46E3-BDB4-8DEE70D698F4}" type="datetimeFigureOut">
               <a:rPr lang="en-US" smtClean="0"/>
-              <a:t>2/10/15</a:t>
+              <a:t>2/12/15</a:t>
             </a:fld>
             <a:endParaRPr lang="en-US"/>
           </a:p>
@@ -4962,7 +4954,7 @@
           <a:p>
             <a:fld id="{3932A18B-CA16-46E3-BDB4-8DEE70D698F4}" type="datetimeFigureOut">
               <a:rPr lang="en-US" smtClean="0"/>
-              <a:t>2/10/15</a:t>
+              <a:t>2/12/15</a:t>
             </a:fld>
             <a:endParaRPr lang="en-US"/>
           </a:p>
@@ -5080,7 +5072,7 @@
           <a:p>
             <a:fld id="{3932A18B-CA16-46E3-BDB4-8DEE70D698F4}" type="datetimeFigureOut">
               <a:rPr lang="en-US" smtClean="0"/>
-              <a:t>2/10/15</a:t>
+              <a:t>2/12/15</a:t>
             </a:fld>
             <a:endParaRPr lang="en-US"/>
           </a:p>
@@ -5175,7 +5167,7 @@
           <a:p>
             <a:fld id="{3932A18B-CA16-46E3-BDB4-8DEE70D698F4}" type="datetimeFigureOut">
               <a:rPr lang="en-US" smtClean="0"/>
-              <a:t>2/10/15</a:t>
+              <a:t>2/12/15</a:t>
             </a:fld>
             <a:endParaRPr lang="en-US"/>
           </a:p>
@@ -5452,7 +5444,7 @@
           <a:p>
             <a:fld id="{3932A18B-CA16-46E3-BDB4-8DEE70D698F4}" type="datetimeFigureOut">
               <a:rPr lang="en-US" smtClean="0"/>
-              <a:t>2/10/15</a:t>
+              <a:t>2/12/15</a:t>
             </a:fld>
             <a:endParaRPr lang="en-US"/>
           </a:p>
@@ -5709,7 +5701,7 @@
           <a:p>
             <a:fld id="{3932A18B-CA16-46E3-BDB4-8DEE70D698F4}" type="datetimeFigureOut">
               <a:rPr lang="en-US" smtClean="0"/>
-              <a:t>2/10/15</a:t>
+              <a:t>2/12/15</a:t>
             </a:fld>
             <a:endParaRPr lang="en-US"/>
           </a:p>
@@ -5922,7 +5914,7 @@
           <a:p>
             <a:fld id="{3932A18B-CA16-46E3-BDB4-8DEE70D698F4}" type="datetimeFigureOut">
               <a:rPr lang="en-US" smtClean="0"/>
-              <a:t>2/10/15</a:t>
+              <a:t>2/12/15</a:t>
             </a:fld>
             <a:endParaRPr lang="en-US"/>
           </a:p>
@@ -6405,7 +6397,7 @@
         </p:nvSpPr>
         <p:spPr>
           <a:xfrm>
-            <a:off x="0" y="29260800"/>
+            <a:off x="8214719" y="29260800"/>
             <a:ext cx="8229600" cy="14630400"/>
           </a:xfrm>
           <a:prstGeom prst="rect">
@@ -6455,7 +6447,7 @@
         </p:nvSpPr>
         <p:spPr>
           <a:xfrm>
-            <a:off x="0" y="29274310"/>
+            <a:off x="8254403" y="29274310"/>
             <a:ext cx="8229600" cy="1197244"/>
           </a:xfrm>
           <a:prstGeom prst="rect">
@@ -6505,7 +6497,7 @@
         </p:nvSpPr>
         <p:spPr>
           <a:xfrm>
-            <a:off x="0" y="29260800"/>
+            <a:off x="12183182" y="26204738"/>
             <a:ext cx="8229600" cy="1947918"/>
           </a:xfrm>
           <a:prstGeom prst="rect">
@@ -6552,7 +6544,7 @@
         </p:nvSpPr>
         <p:spPr>
           <a:xfrm>
-            <a:off x="8229600" y="29260800"/>
+            <a:off x="0" y="29260800"/>
             <a:ext cx="8229600" cy="14630400"/>
           </a:xfrm>
           <a:prstGeom prst="rect">
@@ -6605,7 +6597,7 @@
         </p:nvSpPr>
         <p:spPr>
           <a:xfrm>
-            <a:off x="8229600" y="29266436"/>
+            <a:off x="0" y="29266436"/>
             <a:ext cx="8229600" cy="1197745"/>
           </a:xfrm>
           <a:prstGeom prst="rect">
@@ -6658,7 +6650,7 @@
         </p:nvSpPr>
         <p:spPr>
           <a:xfrm>
-            <a:off x="8229600" y="29260800"/>
+            <a:off x="0" y="29336410"/>
             <a:ext cx="8229600" cy="11181215"/>
           </a:xfrm>
           <a:prstGeom prst="rect">
@@ -8002,7 +7994,7 @@
         </p:blipFill>
         <p:spPr>
           <a:xfrm>
-            <a:off x="2395122" y="31004150"/>
+            <a:off x="10609841" y="31004150"/>
             <a:ext cx="3429000" cy="1828800"/>
           </a:xfrm>
           <a:prstGeom prst="rect">
@@ -8026,7 +8018,7 @@
         </p:blipFill>
         <p:spPr>
           <a:xfrm>
-            <a:off x="992243" y="33541014"/>
+            <a:off x="9206962" y="33541014"/>
             <a:ext cx="2540327" cy="2540327"/>
           </a:xfrm>
           <a:prstGeom prst="rect">
@@ -8050,7 +8042,7 @@
         </p:blipFill>
         <p:spPr>
           <a:xfrm>
-            <a:off x="4513556" y="33535647"/>
+            <a:off x="12728275" y="33535647"/>
             <a:ext cx="2525299" cy="2525299"/>
           </a:xfrm>
           <a:prstGeom prst="rect">
@@ -8074,7 +8066,7 @@
         </p:blipFill>
         <p:spPr>
           <a:xfrm>
-            <a:off x="4565714" y="36593088"/>
+            <a:off x="12780433" y="36593088"/>
             <a:ext cx="2540000" cy="2540000"/>
           </a:xfrm>
           <a:prstGeom prst="rect">
@@ -8098,7 +8090,7 @@
         </p:blipFill>
         <p:spPr>
           <a:xfrm>
-            <a:off x="1034553" y="36549081"/>
+            <a:off x="9249272" y="36549081"/>
             <a:ext cx="2544593" cy="2544593"/>
           </a:xfrm>
           <a:prstGeom prst="rect">
@@ -8125,7 +8117,7 @@
         </p:blipFill>
         <p:spPr>
           <a:xfrm>
-            <a:off x="4567373" y="40046041"/>
+            <a:off x="12782092" y="40046041"/>
             <a:ext cx="2540000" cy="2540000"/>
           </a:xfrm>
           <a:prstGeom prst="rect">
@@ -8149,7 +8141,7 @@
         </p:blipFill>
         <p:spPr>
           <a:xfrm>
-            <a:off x="904295" y="40005801"/>
+            <a:off x="9119014" y="40005801"/>
             <a:ext cx="2548267" cy="2548267"/>
           </a:xfrm>
           <a:prstGeom prst="rect">
@@ -8254,6 +8246,45 @@
               <a:t>Scan this QR code to view the website.</a:t>
             </a:r>
             <a:endParaRPr lang="en-US" dirty="0"/>
+          </a:p>
+        </p:txBody>
+      </p:sp>
+      <p:sp>
+        <p:nvSpPr>
+          <p:cNvPr id="44" name="TextBox 43"/>
+          <p:cNvSpPr txBox="1"/>
+          <p:nvPr/>
+        </p:nvSpPr>
+        <p:spPr>
+          <a:xfrm>
+            <a:off x="8208379" y="29369743"/>
+            <a:ext cx="8229600" cy="1209254"/>
+          </a:xfrm>
+          <a:prstGeom prst="rect">
+            <a:avLst/>
+          </a:prstGeom>
+          <a:noFill/>
+        </p:spPr>
+        <p:txBody>
+          <a:bodyPr wrap="square" rtlCol="0">
+            <a:spAutoFit/>
+          </a:bodyPr>
+          <a:lstStyle/>
+          <a:p>
+            <a:pPr lvl="0" algn="ctr"/>
+            <a:r>
+              <a:rPr lang="en-US" dirty="0" smtClean="0">
+                <a:solidFill>
+                  <a:prstClr val="black"/>
+                </a:solidFill>
+              </a:rPr>
+              <a:t>Technology Utilized</a:t>
+            </a:r>
+            <a:endParaRPr lang="en-US" sz="6000" dirty="0">
+              <a:solidFill>
+                <a:prstClr val="black"/>
+              </a:solidFill>
+            </a:endParaRPr>
           </a:p>
         </p:txBody>
       </p:sp>
@@ -8532,7 +8563,7 @@
   <a:extraClrSchemeLst/>
   <a:extLst>
     <a:ext uri="{05A4C25C-085E-4340-85A3-A5531E510DB2}">
-      <thm15:themeFamily xmlns="" xmlns:thm15="http://schemas.microsoft.com/office/thememl/2012/main" name="Office Theme" id="{62F939B6-93AF-4DB8-9C6B-D6C7DFDC589F}" vid="{4A3C46E8-61CC-4603-A589-7422A47A8E4A}"/>
+      <thm15:themeFamily xmlns:thm15="http://schemas.microsoft.com/office/thememl/2012/main" xmlns="" name="Office Theme" id="{62F939B6-93AF-4DB8-9C6B-D6C7DFDC589F}" vid="{4A3C46E8-61CC-4603-A589-7422A47A8E4A}"/>
     </a:ext>
   </a:extLst>
 </a:theme>

</xml_diff>